<commit_message>
updated the first half of the presentation
</commit_message>
<xml_diff>
--- a/Predicting product demand.pptx
+++ b/Predicting product demand.pptx
@@ -5,7 +5,7 @@
     <p:sldMasterId id="2147483648" r:id="rId1"/>
   </p:sldMasterIdLst>
   <p:notesMasterIdLst>
-    <p:notesMasterId r:id="rId12"/>
+    <p:notesMasterId r:id="rId13"/>
   </p:notesMasterIdLst>
   <p:sldIdLst>
     <p:sldId id="256" r:id="rId2"/>
@@ -13,11 +13,12 @@
     <p:sldId id="257" r:id="rId4"/>
     <p:sldId id="268" r:id="rId5"/>
     <p:sldId id="258" r:id="rId6"/>
-    <p:sldId id="261" r:id="rId7"/>
-    <p:sldId id="260" r:id="rId8"/>
-    <p:sldId id="262" r:id="rId9"/>
-    <p:sldId id="263" r:id="rId10"/>
-    <p:sldId id="266" r:id="rId11"/>
+    <p:sldId id="269" r:id="rId7"/>
+    <p:sldId id="261" r:id="rId8"/>
+    <p:sldId id="260" r:id="rId9"/>
+    <p:sldId id="262" r:id="rId10"/>
+    <p:sldId id="263" r:id="rId11"/>
+    <p:sldId id="266" r:id="rId12"/>
   </p:sldIdLst>
   <p:sldSz cx="12192000" cy="6858000"/>
   <p:notesSz cx="6858000" cy="9144000"/>
@@ -118,7 +119,13 @@
   </p:defaultTextStyle>
   <p:extLst>
     <p:ext uri="{EFAFB233-063F-42B5-8137-9DF3F51BA10A}">
-      <p15:sldGuideLst xmlns:p15="http://schemas.microsoft.com/office/powerpoint/2012/main"/>
+      <p15:sldGuideLst xmlns:p15="http://schemas.microsoft.com/office/powerpoint/2012/main">
+        <p15:guide id="1" orient="horz" pos="4128" userDrawn="1">
+          <p15:clr>
+            <a:srgbClr val="A4A3A4"/>
+          </p15:clr>
+        </p15:guide>
+      </p15:sldGuideLst>
     </p:ext>
   </p:extLst>
 </p:presentation>
@@ -7651,7 +7658,13 @@
   <p:cSld>
     <p:spTree>
       <p:nvGrpSpPr>
-        <p:cNvPr id="1" name=""/>
+        <p:cNvPr id="1" name="">
+          <a:extLst>
+            <a:ext uri="{FF2B5EF4-FFF2-40B4-BE49-F238E27FC236}">
+              <a16:creationId xmlns:a16="http://schemas.microsoft.com/office/drawing/2014/main" id="{B4E1D17A-0291-E80F-2B8D-71442BB37614}"/>
+            </a:ext>
+          </a:extLst>
+        </p:cNvPr>
         <p:cNvGrpSpPr/>
         <p:nvPr/>
       </p:nvGrpSpPr>
@@ -7665,7 +7678,13 @@
       </p:grpSpPr>
       <p:sp>
         <p:nvSpPr>
-          <p:cNvPr id="2" name="Slide Image Placeholder 1"/>
+          <p:cNvPr id="2" name="Slide Image Placeholder 1">
+            <a:extLst>
+              <a:ext uri="{FF2B5EF4-FFF2-40B4-BE49-F238E27FC236}">
+                <a16:creationId xmlns:a16="http://schemas.microsoft.com/office/drawing/2014/main" id="{F48F96E0-0B97-E140-DD70-7A3969678935}"/>
+              </a:ext>
+            </a:extLst>
+          </p:cNvPr>
           <p:cNvSpPr>
             <a:spLocks noGrp="1" noRot="1" noChangeAspect="1"/>
           </p:cNvSpPr>
@@ -7677,7 +7696,13 @@
       </p:sp>
       <p:sp>
         <p:nvSpPr>
-          <p:cNvPr id="3" name="Notes Placeholder 2"/>
+          <p:cNvPr id="3" name="Notes Placeholder 2">
+            <a:extLst>
+              <a:ext uri="{FF2B5EF4-FFF2-40B4-BE49-F238E27FC236}">
+                <a16:creationId xmlns:a16="http://schemas.microsoft.com/office/drawing/2014/main" id="{CA1D3169-F016-EBB7-BA89-CD3FA1602DC8}"/>
+              </a:ext>
+            </a:extLst>
+          </p:cNvPr>
           <p:cNvSpPr>
             <a:spLocks noGrp="1"/>
           </p:cNvSpPr>
@@ -7692,41 +7717,20 @@
           <a:p>
             <a:r>
               <a:rPr lang="en-US" dirty="0"/>
-              <a:t>As mentioned before, the training data set has roughly 75 million rows!  There are around 880k unique clients and 2.5k unique products.</a:t>
-            </a:r>
-          </a:p>
-          <a:p>
-            <a:endParaRPr lang="en-US" dirty="0"/>
-          </a:p>
-          <a:p>
-            <a:r>
-              <a:rPr lang="en-US" dirty="0"/>
-              <a:t>Many client/product pairs have missing values.  A common occurrence is ‘client X buys some amount of product Y in weeks 3, 7, and 8’.  There is no data for client X and product Y in weeks 4, 5, 6, 9.  Did client X not purchase any of product Y during those weeks? Or is this data missing? The answer is not provided.</a:t>
-            </a:r>
-          </a:p>
-          <a:p>
-            <a:endParaRPr lang="en-US" dirty="0"/>
-          </a:p>
-          <a:p>
-            <a:r>
-              <a:rPr lang="en-US" dirty="0"/>
-              <a:t>The clients for which we predict demand in weeks 10 and/or 11 may not be present in weeks 3 through 9.  The same issue appears for training models.  If we use weeks 3 – 8 to train a model, there are new clients in week 9.</a:t>
-            </a:r>
-          </a:p>
-          <a:p>
-            <a:endParaRPr lang="en-US" dirty="0"/>
-          </a:p>
-          <a:p>
-            <a:r>
-              <a:rPr lang="en-US" dirty="0"/>
-              <a:t>This is a time series data set with only 7 time entries!</a:t>
+              <a:t>The figure on the left shows the distribution of clients based on their average demand. As you can see, most firms demand less than 10 units per week. The right figure shows the clients' distribution based on the number of unique products they bought. This figure shows that the lion’s share of clients demand various products. Taken together, it seems most clients have demand across a variety of products; however, they demand low quantities of each product.</a:t>
             </a:r>
           </a:p>
         </p:txBody>
       </p:sp>
       <p:sp>
         <p:nvSpPr>
-          <p:cNvPr id="4" name="Slide Number Placeholder 3"/>
+          <p:cNvPr id="4" name="Slide Number Placeholder 3">
+            <a:extLst>
+              <a:ext uri="{FF2B5EF4-FFF2-40B4-BE49-F238E27FC236}">
+                <a16:creationId xmlns:a16="http://schemas.microsoft.com/office/drawing/2014/main" id="{C8B99FAB-2044-15DB-DA20-1A5ADF4B7464}"/>
+              </a:ext>
+            </a:extLst>
+          </p:cNvPr>
           <p:cNvSpPr>
             <a:spLocks noGrp="1"/>
           </p:cNvSpPr>
@@ -7750,7 +7754,7 @@
     </p:spTree>
     <p:extLst>
       <p:ext uri="{BB962C8B-B14F-4D97-AF65-F5344CB8AC3E}">
-        <p14:creationId xmlns:p14="http://schemas.microsoft.com/office/powerpoint/2010/main" val="752841090"/>
+        <p14:creationId xmlns:p14="http://schemas.microsoft.com/office/powerpoint/2010/main" val="3394963561"/>
       </p:ext>
     </p:extLst>
   </p:cSld>
@@ -7804,6 +7808,137 @@
           <a:bodyPr/>
           <a:lstStyle/>
           <a:p>
+            <a:pPr marL="0" marR="0" lvl="0" indent="0" algn="l" defTabSz="914400" rtl="0" eaLnBrk="1" fontAlgn="auto" latinLnBrk="0" hangingPunct="1">
+              <a:lnSpc>
+                <a:spcPct val="100000"/>
+              </a:lnSpc>
+              <a:spcBef>
+                <a:spcPts val="0"/>
+              </a:spcBef>
+              <a:spcAft>
+                <a:spcPts val="0"/>
+              </a:spcAft>
+              <a:buClrTx/>
+              <a:buSzTx/>
+              <a:buFontTx/>
+              <a:buNone/>
+              <a:tabLst/>
+              <a:defRPr/>
+            </a:pPr>
+            <a:r>
+              <a:rPr lang="en-US" dirty="0"/>
+              <a:t>This is a panel data set with only 7 periods.</a:t>
+            </a:r>
+          </a:p>
+          <a:p>
+            <a:endParaRPr lang="en-US" dirty="0"/>
+          </a:p>
+          <a:p>
+            <a:r>
+              <a:rPr lang="en-US" dirty="0"/>
+              <a:t>As mentioned before, the training data set has roughly 75 million rows!  There are around 880k unique clients and 2.5k unique products.</a:t>
+            </a:r>
+          </a:p>
+          <a:p>
+            <a:endParaRPr lang="en-US" dirty="0"/>
+          </a:p>
+          <a:p>
+            <a:r>
+              <a:rPr lang="en-US" dirty="0"/>
+              <a:t>Many client/product pairs have missing values.  A common occurrence is ‘client X buys some amount of product Y in weeks 3, 7, and 8’.  There is no data for client X and product Y in weeks 4, 5, 6, 9.  Did client X not purchase any of product Y during those weeks? Or is this data missing? The answer is not provided.</a:t>
+            </a:r>
+          </a:p>
+          <a:p>
+            <a:endParaRPr lang="en-US" dirty="0"/>
+          </a:p>
+          <a:p>
+            <a:r>
+              <a:rPr lang="en-US" dirty="0"/>
+              <a:t>The clients for which we predict demand in weeks 10 and/or 11 may not be present in weeks 3 through 9.  The same issue appears for training models.  If we use weeks 3 – 8 observations to train a model, there are new clients in week 9.</a:t>
+            </a:r>
+          </a:p>
+        </p:txBody>
+      </p:sp>
+      <p:sp>
+        <p:nvSpPr>
+          <p:cNvPr id="4" name="Slide Number Placeholder 3"/>
+          <p:cNvSpPr>
+            <a:spLocks noGrp="1"/>
+          </p:cNvSpPr>
+          <p:nvPr>
+            <p:ph type="sldNum" sz="quarter" idx="5"/>
+          </p:nvPr>
+        </p:nvSpPr>
+        <p:spPr/>
+        <p:txBody>
+          <a:bodyPr/>
+          <a:lstStyle/>
+          <a:p>
+            <a:fld id="{9881FB53-477E-47AB-9C04-CE32FC40BF5A}" type="slidenum">
+              <a:rPr lang="en-US" smtClean="0"/>
+              <a:t>7</a:t>
+            </a:fld>
+            <a:endParaRPr lang="en-US"/>
+          </a:p>
+        </p:txBody>
+      </p:sp>
+    </p:spTree>
+    <p:extLst>
+      <p:ext uri="{BB962C8B-B14F-4D97-AF65-F5344CB8AC3E}">
+        <p14:creationId xmlns:p14="http://schemas.microsoft.com/office/powerpoint/2010/main" val="752841090"/>
+      </p:ext>
+    </p:extLst>
+  </p:cSld>
+  <p:clrMapOvr>
+    <a:masterClrMapping/>
+  </p:clrMapOvr>
+</p:notes>
+</file>
+
+<file path=ppt/notesSlides/notesSlide7.xml><?xml version="1.0" encoding="utf-8"?>
+<p:notes xmlns:a="http://schemas.openxmlformats.org/drawingml/2006/main" xmlns:r="http://schemas.openxmlformats.org/officeDocument/2006/relationships" xmlns:p="http://schemas.openxmlformats.org/presentationml/2006/main">
+  <p:cSld>
+    <p:spTree>
+      <p:nvGrpSpPr>
+        <p:cNvPr id="1" name=""/>
+        <p:cNvGrpSpPr/>
+        <p:nvPr/>
+      </p:nvGrpSpPr>
+      <p:grpSpPr>
+        <a:xfrm>
+          <a:off x="0" y="0"/>
+          <a:ext cx="0" cy="0"/>
+          <a:chOff x="0" y="0"/>
+          <a:chExt cx="0" cy="0"/>
+        </a:xfrm>
+      </p:grpSpPr>
+      <p:sp>
+        <p:nvSpPr>
+          <p:cNvPr id="2" name="Slide Image Placeholder 1"/>
+          <p:cNvSpPr>
+            <a:spLocks noGrp="1" noRot="1" noChangeAspect="1"/>
+          </p:cNvSpPr>
+          <p:nvPr>
+            <p:ph type="sldImg"/>
+          </p:nvPr>
+        </p:nvSpPr>
+        <p:spPr/>
+      </p:sp>
+      <p:sp>
+        <p:nvSpPr>
+          <p:cNvPr id="3" name="Notes Placeholder 2"/>
+          <p:cNvSpPr>
+            <a:spLocks noGrp="1"/>
+          </p:cNvSpPr>
+          <p:nvPr>
+            <p:ph type="body" idx="1"/>
+          </p:nvPr>
+        </p:nvSpPr>
+        <p:spPr/>
+        <p:txBody>
+          <a:bodyPr/>
+          <a:lstStyle/>
+          <a:p>
             <a:r>
               <a:rPr lang="en-US" dirty="0"/>
               <a:t>Our best performing model is a </a:t>
@@ -7844,7 +7979,7 @@
           <a:p>
             <a:fld id="{9881FB53-477E-47AB-9C04-CE32FC40BF5A}" type="slidenum">
               <a:rPr lang="en-US" smtClean="0"/>
-              <a:t>9</a:t>
+              <a:t>10</a:t>
             </a:fld>
             <a:endParaRPr lang="en-US"/>
           </a:p>
@@ -11623,6 +11758,118 @@
           <p:cNvPr id="2" name="Title 1">
             <a:extLst>
               <a:ext uri="{FF2B5EF4-FFF2-40B4-BE49-F238E27FC236}">
+                <a16:creationId xmlns:a16="http://schemas.microsoft.com/office/drawing/2014/main" id="{FE9E90A2-174E-5B20-640F-5D4DD79EC5C9}"/>
+              </a:ext>
+            </a:extLst>
+          </p:cNvPr>
+          <p:cNvSpPr>
+            <a:spLocks noGrp="1"/>
+          </p:cNvSpPr>
+          <p:nvPr>
+            <p:ph type="title"/>
+          </p:nvPr>
+        </p:nvSpPr>
+        <p:spPr/>
+        <p:txBody>
+          <a:bodyPr/>
+          <a:lstStyle/>
+          <a:p>
+            <a:r>
+              <a:rPr lang="en-US" dirty="0" err="1"/>
+              <a:t>xgboost</a:t>
+            </a:r>
+            <a:r>
+              <a:rPr lang="en-US" dirty="0"/>
+              <a:t> model</a:t>
+            </a:r>
+          </a:p>
+        </p:txBody>
+      </p:sp>
+      <p:sp>
+        <p:nvSpPr>
+          <p:cNvPr id="3" name="Content Placeholder 2">
+            <a:extLst>
+              <a:ext uri="{FF2B5EF4-FFF2-40B4-BE49-F238E27FC236}">
+                <a16:creationId xmlns:a16="http://schemas.microsoft.com/office/drawing/2014/main" id="{D8515897-033D-B200-2EC8-376CF4FBA309}"/>
+              </a:ext>
+            </a:extLst>
+          </p:cNvPr>
+          <p:cNvSpPr>
+            <a:spLocks noGrp="1"/>
+          </p:cNvSpPr>
+          <p:nvPr>
+            <p:ph idx="1"/>
+          </p:nvPr>
+        </p:nvSpPr>
+        <p:spPr/>
+        <p:txBody>
+          <a:bodyPr/>
+          <a:lstStyle/>
+          <a:p>
+            <a:r>
+              <a:rPr lang="en-US" dirty="0" err="1"/>
+              <a:t>GridSearch</a:t>
+            </a:r>
+            <a:r>
+              <a:rPr lang="en-US" dirty="0"/>
+              <a:t> cross validation</a:t>
+            </a:r>
+          </a:p>
+          <a:p>
+            <a:r>
+              <a:rPr lang="en-US" dirty="0"/>
+              <a:t>Features: adjusted demand of the previous 3 weeks, client ID, client mean/median/min/max, product ID, product mean/median</a:t>
+            </a:r>
+          </a:p>
+          <a:p>
+            <a:r>
+              <a:rPr lang="en-US" dirty="0"/>
+              <a:t>Root mean squared log error of 0.493</a:t>
+            </a:r>
+          </a:p>
+          <a:p>
+            <a:r>
+              <a:rPr lang="en-US" dirty="0"/>
+              <a:t>Top Kaggle score is 0.442</a:t>
+            </a:r>
+          </a:p>
+        </p:txBody>
+      </p:sp>
+    </p:spTree>
+    <p:extLst>
+      <p:ext uri="{BB962C8B-B14F-4D97-AF65-F5344CB8AC3E}">
+        <p14:creationId xmlns:p14="http://schemas.microsoft.com/office/powerpoint/2010/main" val="1019809051"/>
+      </p:ext>
+    </p:extLst>
+  </p:cSld>
+  <p:clrMapOvr>
+    <a:masterClrMapping/>
+  </p:clrMapOvr>
+</p:sld>
+</file>
+
+<file path=ppt/slides/slide11.xml><?xml version="1.0" encoding="utf-8"?>
+<p:sld xmlns:a="http://schemas.openxmlformats.org/drawingml/2006/main" xmlns:r="http://schemas.openxmlformats.org/officeDocument/2006/relationships" xmlns:p="http://schemas.openxmlformats.org/presentationml/2006/main">
+  <p:cSld>
+    <p:spTree>
+      <p:nvGrpSpPr>
+        <p:cNvPr id="1" name=""/>
+        <p:cNvGrpSpPr/>
+        <p:nvPr/>
+      </p:nvGrpSpPr>
+      <p:grpSpPr>
+        <a:xfrm>
+          <a:off x="0" y="0"/>
+          <a:ext cx="0" cy="0"/>
+          <a:chOff x="0" y="0"/>
+          <a:chExt cx="0" cy="0"/>
+        </a:xfrm>
+      </p:grpSpPr>
+      <p:sp>
+        <p:nvSpPr>
+          <p:cNvPr id="2" name="Title 1">
+            <a:extLst>
+              <a:ext uri="{FF2B5EF4-FFF2-40B4-BE49-F238E27FC236}">
                 <a16:creationId xmlns:a16="http://schemas.microsoft.com/office/drawing/2014/main" id="{A70C10F9-D432-8FE9-2264-B24324819E68}"/>
               </a:ext>
             </a:extLst>
@@ -13248,6 +13495,615 @@
 <file path=ppt/slides/slide6.xml><?xml version="1.0" encoding="utf-8"?>
 <p:sld xmlns:a="http://schemas.openxmlformats.org/drawingml/2006/main" xmlns:r="http://schemas.openxmlformats.org/officeDocument/2006/relationships" xmlns:p="http://schemas.openxmlformats.org/presentationml/2006/main">
   <p:cSld>
+    <p:bg>
+      <p:bgPr>
+        <a:solidFill>
+          <a:schemeClr val="bg1"/>
+        </a:solidFill>
+        <a:effectLst/>
+      </p:bgPr>
+    </p:bg>
+    <p:spTree>
+      <p:nvGrpSpPr>
+        <p:cNvPr id="1" name="">
+          <a:extLst>
+            <a:ext uri="{FF2B5EF4-FFF2-40B4-BE49-F238E27FC236}">
+              <a16:creationId xmlns:a16="http://schemas.microsoft.com/office/drawing/2014/main" id="{F7D70B45-6983-0ED6-4C39-BC9724B7F43E}"/>
+            </a:ext>
+          </a:extLst>
+        </p:cNvPr>
+        <p:cNvGrpSpPr/>
+        <p:nvPr/>
+      </p:nvGrpSpPr>
+      <p:grpSpPr>
+        <a:xfrm>
+          <a:off x="0" y="0"/>
+          <a:ext cx="0" cy="0"/>
+          <a:chOff x="0" y="0"/>
+          <a:chExt cx="0" cy="0"/>
+        </a:xfrm>
+      </p:grpSpPr>
+      <p:sp useBgFill="1">
+        <p:nvSpPr>
+          <p:cNvPr id="85" name="Rectangle 84">
+            <a:extLst>
+              <a:ext uri="{FF2B5EF4-FFF2-40B4-BE49-F238E27FC236}">
+                <a16:creationId xmlns:a16="http://schemas.microsoft.com/office/drawing/2014/main" id="{D55CA618-78A6-47F6-B865-E9315164FB49}"/>
+              </a:ext>
+              <a:ext uri="{C183D7F6-B498-43B3-948B-1728B52AA6E4}">
+                <adec:decorative xmlns:adec="http://schemas.microsoft.com/office/drawing/2017/decorative" val="1"/>
+              </a:ext>
+            </a:extLst>
+          </p:cNvPr>
+          <p:cNvSpPr>
+            <a:spLocks noGrp="1" noRot="1" noChangeAspect="1" noMove="1" noResize="1" noEditPoints="1" noAdjustHandles="1" noChangeArrowheads="1" noChangeShapeType="1" noTextEdit="1"/>
+          </p:cNvSpPr>
+          <p:nvPr>
+            <p:extLst>
+              <p:ext uri="{386F3935-93C4-4BCD-93E2-E3B085C9AB24}">
+                <p16:designElem xmlns:p16="http://schemas.microsoft.com/office/powerpoint/2015/main" val="1"/>
+              </p:ext>
+            </p:extLst>
+          </p:nvPr>
+        </p:nvSpPr>
+        <p:spPr>
+          <a:xfrm>
+            <a:off x="0" y="0"/>
+            <a:ext cx="12191999" cy="6857365"/>
+          </a:xfrm>
+          <a:prstGeom prst="rect">
+            <a:avLst/>
+          </a:prstGeom>
+          <a:ln>
+            <a:noFill/>
+          </a:ln>
+        </p:spPr>
+        <p:style>
+          <a:lnRef idx="2">
+            <a:schemeClr val="accent1">
+              <a:shade val="50000"/>
+            </a:schemeClr>
+          </a:lnRef>
+          <a:fillRef idx="1">
+            <a:schemeClr val="accent1"/>
+          </a:fillRef>
+          <a:effectRef idx="0">
+            <a:schemeClr val="accent1"/>
+          </a:effectRef>
+          <a:fontRef idx="minor">
+            <a:schemeClr val="lt1"/>
+          </a:fontRef>
+        </p:style>
+        <p:txBody>
+          <a:bodyPr rtlCol="0" anchor="ctr"/>
+          <a:lstStyle/>
+          <a:p>
+            <a:pPr algn="ctr"/>
+            <a:endParaRPr lang="en-US"/>
+          </a:p>
+        </p:txBody>
+      </p:sp>
+      <p:grpSp>
+        <p:nvGrpSpPr>
+          <p:cNvPr id="87" name="Group 86">
+            <a:extLst>
+              <a:ext uri="{FF2B5EF4-FFF2-40B4-BE49-F238E27FC236}">
+                <a16:creationId xmlns:a16="http://schemas.microsoft.com/office/drawing/2014/main" id="{B83D307E-DF68-43F8-97CE-0AAE950A7129}"/>
+              </a:ext>
+              <a:ext uri="{C183D7F6-B498-43B3-948B-1728B52AA6E4}">
+                <adec:decorative xmlns:adec="http://schemas.microsoft.com/office/drawing/2017/decorative" val="1"/>
+              </a:ext>
+            </a:extLst>
+          </p:cNvPr>
+          <p:cNvGrpSpPr>
+            <a:grpSpLocks noGrp="1" noUngrp="1" noRot="1" noChangeAspect="1" noMove="1" noResize="1"/>
+          </p:cNvGrpSpPr>
+          <p:nvPr>
+            <p:extLst>
+              <p:ext uri="{386F3935-93C4-4BCD-93E2-E3B085C9AB24}">
+                <p16:designElem xmlns:p16="http://schemas.microsoft.com/office/powerpoint/2015/main" val="1"/>
+              </p:ext>
+            </p:extLst>
+          </p:nvPr>
+        </p:nvGrpSpPr>
+        <p:grpSpPr>
+          <a:xfrm>
+            <a:off x="2271255" y="-1"/>
+            <a:ext cx="7649490" cy="5728133"/>
+            <a:chOff x="329184" y="1"/>
+            <a:chExt cx="524256" cy="5728133"/>
+          </a:xfrm>
+        </p:grpSpPr>
+        <p:cxnSp>
+          <p:nvCxnSpPr>
+            <p:cNvPr id="88" name="Straight Connector 87">
+              <a:extLst>
+                <a:ext uri="{FF2B5EF4-FFF2-40B4-BE49-F238E27FC236}">
+                  <a16:creationId xmlns:a16="http://schemas.microsoft.com/office/drawing/2014/main" id="{5546E3D2-37BF-4528-9851-2B2F628234A2}"/>
+                </a:ext>
+                <a:ext uri="{C183D7F6-B498-43B3-948B-1728B52AA6E4}">
+                  <adec:decorative xmlns:adec="http://schemas.microsoft.com/office/drawing/2017/decorative" val="1"/>
+                </a:ext>
+              </a:extLst>
+            </p:cNvPr>
+            <p:cNvCxnSpPr>
+              <a:cxnSpLocks/>
+            </p:cNvCxnSpPr>
+            <p:nvPr>
+              <p:extLst>
+                <p:ext uri="{386F3935-93C4-4BCD-93E2-E3B085C9AB24}">
+                  <p16:designElem xmlns:p16="http://schemas.microsoft.com/office/powerpoint/2015/main" val="1"/>
+                </p:ext>
+              </p:extLst>
+            </p:nvPr>
+          </p:nvCxnSpPr>
+          <p:spPr>
+            <a:xfrm flipH="1">
+              <a:off x="329184" y="5728134"/>
+              <a:ext cx="523824" cy="0"/>
+            </a:xfrm>
+            <a:prstGeom prst="line">
+              <a:avLst/>
+            </a:prstGeom>
+            <a:ln w="152400">
+              <a:solidFill>
+                <a:schemeClr val="accent4"/>
+              </a:solidFill>
+            </a:ln>
+          </p:spPr>
+          <p:style>
+            <a:lnRef idx="1">
+              <a:schemeClr val="accent1"/>
+            </a:lnRef>
+            <a:fillRef idx="0">
+              <a:schemeClr val="accent1"/>
+            </a:fillRef>
+            <a:effectRef idx="0">
+              <a:schemeClr val="accent1"/>
+            </a:effectRef>
+            <a:fontRef idx="minor">
+              <a:schemeClr val="tx1"/>
+            </a:fontRef>
+          </p:style>
+        </p:cxnSp>
+        <p:sp>
+          <p:nvSpPr>
+            <p:cNvPr id="89" name="Rectangle 88">
+              <a:extLst>
+                <a:ext uri="{FF2B5EF4-FFF2-40B4-BE49-F238E27FC236}">
+                  <a16:creationId xmlns:a16="http://schemas.microsoft.com/office/drawing/2014/main" id="{752A0C69-DC4E-4FC0-843C-BAA27B3A5621}"/>
+                </a:ext>
+                <a:ext uri="{C183D7F6-B498-43B3-948B-1728B52AA6E4}">
+                  <adec:decorative xmlns:adec="http://schemas.microsoft.com/office/drawing/2017/decorative" val="1"/>
+                </a:ext>
+              </a:extLst>
+            </p:cNvPr>
+            <p:cNvSpPr/>
+            <p:nvPr>
+              <p:extLst>
+                <p:ext uri="{386F3935-93C4-4BCD-93E2-E3B085C9AB24}">
+                  <p16:designElem xmlns:p16="http://schemas.microsoft.com/office/powerpoint/2015/main" val="1"/>
+                </p:ext>
+              </p:extLst>
+            </p:nvPr>
+          </p:nvSpPr>
+          <p:spPr>
+            <a:xfrm>
+              <a:off x="329184" y="1"/>
+              <a:ext cx="524256" cy="5532119"/>
+            </a:xfrm>
+            <a:prstGeom prst="rect">
+              <a:avLst/>
+            </a:prstGeom>
+            <a:solidFill>
+              <a:schemeClr val="accent4"/>
+            </a:solidFill>
+            <a:ln>
+              <a:noFill/>
+            </a:ln>
+          </p:spPr>
+          <p:style>
+            <a:lnRef idx="2">
+              <a:schemeClr val="accent1">
+                <a:shade val="50000"/>
+              </a:schemeClr>
+            </a:lnRef>
+            <a:fillRef idx="1">
+              <a:schemeClr val="accent1"/>
+            </a:fillRef>
+            <a:effectRef idx="0">
+              <a:schemeClr val="accent1"/>
+            </a:effectRef>
+            <a:fontRef idx="minor">
+              <a:schemeClr val="lt1"/>
+            </a:fontRef>
+          </p:style>
+          <p:txBody>
+            <a:bodyPr rtlCol="0" anchor="ctr"/>
+            <a:lstStyle/>
+            <a:p>
+              <a:pPr algn="ctr"/>
+              <a:endParaRPr lang="en-US" dirty="0"/>
+            </a:p>
+          </p:txBody>
+        </p:sp>
+      </p:grpSp>
+      <p:sp>
+        <p:nvSpPr>
+          <p:cNvPr id="91" name="Rectangle 90">
+            <a:extLst>
+              <a:ext uri="{FF2B5EF4-FFF2-40B4-BE49-F238E27FC236}">
+                <a16:creationId xmlns:a16="http://schemas.microsoft.com/office/drawing/2014/main" id="{8ED94938-268E-4C0A-A08A-B3980C78BAEB}"/>
+              </a:ext>
+              <a:ext uri="{C183D7F6-B498-43B3-948B-1728B52AA6E4}">
+                <adec:decorative xmlns:adec="http://schemas.microsoft.com/office/drawing/2017/decorative" val="1"/>
+              </a:ext>
+            </a:extLst>
+          </p:cNvPr>
+          <p:cNvSpPr>
+            <a:spLocks noGrp="1" noRot="1" noChangeAspect="1" noMove="1" noResize="1" noEditPoints="1" noAdjustHandles="1" noChangeArrowheads="1" noChangeShapeType="1" noTextEdit="1"/>
+          </p:cNvSpPr>
+          <p:nvPr>
+            <p:extLst>
+              <p:ext uri="{386F3935-93C4-4BCD-93E2-E3B085C9AB24}">
+                <p16:designElem xmlns:p16="http://schemas.microsoft.com/office/powerpoint/2015/main" val="1"/>
+              </p:ext>
+            </p:extLst>
+          </p:nvPr>
+        </p:nvSpPr>
+        <p:spPr>
+          <a:xfrm>
+            <a:off x="596464" y="318045"/>
+            <a:ext cx="10999072" cy="5325139"/>
+          </a:xfrm>
+          <a:prstGeom prst="rect">
+            <a:avLst/>
+          </a:prstGeom>
+          <a:solidFill>
+            <a:schemeClr val="bg1"/>
+          </a:solidFill>
+          <a:ln>
+            <a:noFill/>
+          </a:ln>
+          <a:effectLst>
+            <a:outerShdw blurRad="139700" dist="127000" dir="5400000" algn="t" rotWithShape="0">
+              <a:prstClr val="black">
+                <a:alpha val="15000"/>
+              </a:prstClr>
+            </a:outerShdw>
+          </a:effectLst>
+        </p:spPr>
+        <p:style>
+          <a:lnRef idx="2">
+            <a:schemeClr val="accent1">
+              <a:shade val="50000"/>
+            </a:schemeClr>
+          </a:lnRef>
+          <a:fillRef idx="1">
+            <a:schemeClr val="accent1"/>
+          </a:fillRef>
+          <a:effectRef idx="0">
+            <a:schemeClr val="accent1"/>
+          </a:effectRef>
+          <a:fontRef idx="minor">
+            <a:schemeClr val="lt1"/>
+          </a:fontRef>
+        </p:style>
+        <p:txBody>
+          <a:bodyPr rtlCol="0" anchor="ctr"/>
+          <a:lstStyle/>
+          <a:p>
+            <a:pPr algn="ctr"/>
+            <a:endParaRPr lang="en-US"/>
+          </a:p>
+        </p:txBody>
+      </p:sp>
+      <p:sp>
+        <p:nvSpPr>
+          <p:cNvPr id="31" name="Text Placeholder 11">
+            <a:extLst>
+              <a:ext uri="{FF2B5EF4-FFF2-40B4-BE49-F238E27FC236}">
+                <a16:creationId xmlns:a16="http://schemas.microsoft.com/office/drawing/2014/main" id="{82270B4D-7F51-F043-0B41-A5F32A1CFC06}"/>
+              </a:ext>
+            </a:extLst>
+          </p:cNvPr>
+          <p:cNvSpPr txBox="1">
+            <a:spLocks/>
+          </p:cNvSpPr>
+          <p:nvPr/>
+        </p:nvSpPr>
+        <p:spPr>
+          <a:xfrm>
+            <a:off x="899365" y="664992"/>
+            <a:ext cx="10071536" cy="929750"/>
+          </a:xfrm>
+          <a:prstGeom prst="rect">
+            <a:avLst/>
+          </a:prstGeom>
+        </p:spPr>
+        <p:txBody>
+          <a:bodyPr vert="horz" lIns="91440" tIns="45720" rIns="91440" bIns="45720" rtlCol="0" anchor="b">
+            <a:normAutofit/>
+          </a:bodyPr>
+          <a:lstStyle>
+            <a:lvl1pPr marL="228600" indent="-228600" algn="l" defTabSz="914400" rtl="0" eaLnBrk="1" latinLnBrk="0" hangingPunct="1">
+              <a:lnSpc>
+                <a:spcPct val="90000"/>
+              </a:lnSpc>
+              <a:spcBef>
+                <a:spcPts val="1000"/>
+              </a:spcBef>
+              <a:buFont typeface="Arial" panose="020B0604020202020204" pitchFamily="34" charset="0"/>
+              <a:buChar char="•"/>
+              <a:defRPr sz="2800" kern="1200">
+                <a:solidFill>
+                  <a:schemeClr val="tx1"/>
+                </a:solidFill>
+                <a:latin typeface="+mn-lt"/>
+                <a:ea typeface="+mn-ea"/>
+                <a:cs typeface="+mn-cs"/>
+              </a:defRPr>
+            </a:lvl1pPr>
+            <a:lvl2pPr marL="685800" indent="-228600" algn="l" defTabSz="914400" rtl="0" eaLnBrk="1" latinLnBrk="0" hangingPunct="1">
+              <a:lnSpc>
+                <a:spcPct val="90000"/>
+              </a:lnSpc>
+              <a:spcBef>
+                <a:spcPts val="500"/>
+              </a:spcBef>
+              <a:buFont typeface="Arial" panose="020B0604020202020204" pitchFamily="34" charset="0"/>
+              <a:buChar char="•"/>
+              <a:defRPr sz="2400" kern="1200">
+                <a:solidFill>
+                  <a:schemeClr val="tx1"/>
+                </a:solidFill>
+                <a:latin typeface="+mn-lt"/>
+                <a:ea typeface="+mn-ea"/>
+                <a:cs typeface="+mn-cs"/>
+              </a:defRPr>
+            </a:lvl2pPr>
+            <a:lvl3pPr marL="1143000" indent="-228600" algn="l" defTabSz="914400" rtl="0" eaLnBrk="1" latinLnBrk="0" hangingPunct="1">
+              <a:lnSpc>
+                <a:spcPct val="90000"/>
+              </a:lnSpc>
+              <a:spcBef>
+                <a:spcPts val="500"/>
+              </a:spcBef>
+              <a:buFont typeface="Arial" panose="020B0604020202020204" pitchFamily="34" charset="0"/>
+              <a:buChar char="•"/>
+              <a:defRPr sz="2000" kern="1200">
+                <a:solidFill>
+                  <a:schemeClr val="tx1"/>
+                </a:solidFill>
+                <a:latin typeface="+mn-lt"/>
+                <a:ea typeface="+mn-ea"/>
+                <a:cs typeface="+mn-cs"/>
+              </a:defRPr>
+            </a:lvl3pPr>
+            <a:lvl4pPr marL="1600200" indent="-228600" algn="l" defTabSz="914400" rtl="0" eaLnBrk="1" latinLnBrk="0" hangingPunct="1">
+              <a:lnSpc>
+                <a:spcPct val="90000"/>
+              </a:lnSpc>
+              <a:spcBef>
+                <a:spcPts val="500"/>
+              </a:spcBef>
+              <a:buFont typeface="Arial" panose="020B0604020202020204" pitchFamily="34" charset="0"/>
+              <a:buChar char="•"/>
+              <a:defRPr sz="1800" kern="1200">
+                <a:solidFill>
+                  <a:schemeClr val="tx1"/>
+                </a:solidFill>
+                <a:latin typeface="+mn-lt"/>
+                <a:ea typeface="+mn-ea"/>
+                <a:cs typeface="+mn-cs"/>
+              </a:defRPr>
+            </a:lvl4pPr>
+            <a:lvl5pPr marL="2057400" indent="-228600" algn="l" defTabSz="914400" rtl="0" eaLnBrk="1" latinLnBrk="0" hangingPunct="1">
+              <a:lnSpc>
+                <a:spcPct val="90000"/>
+              </a:lnSpc>
+              <a:spcBef>
+                <a:spcPts val="500"/>
+              </a:spcBef>
+              <a:buFont typeface="Arial" panose="020B0604020202020204" pitchFamily="34" charset="0"/>
+              <a:buChar char="•"/>
+              <a:defRPr sz="1800" kern="1200">
+                <a:solidFill>
+                  <a:schemeClr val="tx1"/>
+                </a:solidFill>
+                <a:latin typeface="+mn-lt"/>
+                <a:ea typeface="+mn-ea"/>
+                <a:cs typeface="+mn-cs"/>
+              </a:defRPr>
+            </a:lvl5pPr>
+            <a:lvl6pPr marL="2514600" indent="-228600" algn="l" defTabSz="914400" rtl="0" eaLnBrk="1" latinLnBrk="0" hangingPunct="1">
+              <a:lnSpc>
+                <a:spcPct val="90000"/>
+              </a:lnSpc>
+              <a:spcBef>
+                <a:spcPts val="500"/>
+              </a:spcBef>
+              <a:buFont typeface="Arial" panose="020B0604020202020204" pitchFamily="34" charset="0"/>
+              <a:buChar char="•"/>
+              <a:defRPr sz="1800" kern="1200">
+                <a:solidFill>
+                  <a:schemeClr val="tx1"/>
+                </a:solidFill>
+                <a:latin typeface="+mn-lt"/>
+                <a:ea typeface="+mn-ea"/>
+                <a:cs typeface="+mn-cs"/>
+              </a:defRPr>
+            </a:lvl6pPr>
+            <a:lvl7pPr marL="2971800" indent="-228600" algn="l" defTabSz="914400" rtl="0" eaLnBrk="1" latinLnBrk="0" hangingPunct="1">
+              <a:lnSpc>
+                <a:spcPct val="90000"/>
+              </a:lnSpc>
+              <a:spcBef>
+                <a:spcPts val="500"/>
+              </a:spcBef>
+              <a:buFont typeface="Arial" panose="020B0604020202020204" pitchFamily="34" charset="0"/>
+              <a:buChar char="•"/>
+              <a:defRPr sz="1800" kern="1200">
+                <a:solidFill>
+                  <a:schemeClr val="tx1"/>
+                </a:solidFill>
+                <a:latin typeface="+mn-lt"/>
+                <a:ea typeface="+mn-ea"/>
+                <a:cs typeface="+mn-cs"/>
+              </a:defRPr>
+            </a:lvl7pPr>
+            <a:lvl8pPr marL="3429000" indent="-228600" algn="l" defTabSz="914400" rtl="0" eaLnBrk="1" latinLnBrk="0" hangingPunct="1">
+              <a:lnSpc>
+                <a:spcPct val="90000"/>
+              </a:lnSpc>
+              <a:spcBef>
+                <a:spcPts val="500"/>
+              </a:spcBef>
+              <a:buFont typeface="Arial" panose="020B0604020202020204" pitchFamily="34" charset="0"/>
+              <a:buChar char="•"/>
+              <a:defRPr sz="1800" kern="1200">
+                <a:solidFill>
+                  <a:schemeClr val="tx1"/>
+                </a:solidFill>
+                <a:latin typeface="+mn-lt"/>
+                <a:ea typeface="+mn-ea"/>
+                <a:cs typeface="+mn-cs"/>
+              </a:defRPr>
+            </a:lvl8pPr>
+            <a:lvl9pPr marL="3886200" indent="-228600" algn="l" defTabSz="914400" rtl="0" eaLnBrk="1" latinLnBrk="0" hangingPunct="1">
+              <a:lnSpc>
+                <a:spcPct val="90000"/>
+              </a:lnSpc>
+              <a:spcBef>
+                <a:spcPts val="500"/>
+              </a:spcBef>
+              <a:buFont typeface="Arial" panose="020B0604020202020204" pitchFamily="34" charset="0"/>
+              <a:buChar char="•"/>
+              <a:defRPr sz="1800" kern="1200">
+                <a:solidFill>
+                  <a:schemeClr val="tx1"/>
+                </a:solidFill>
+                <a:latin typeface="+mn-lt"/>
+                <a:ea typeface="+mn-ea"/>
+                <a:cs typeface="+mn-cs"/>
+              </a:defRPr>
+            </a:lvl9pPr>
+          </a:lstStyle>
+          <a:p>
+            <a:pPr algn="ctr">
+              <a:spcBef>
+                <a:spcPct val="0"/>
+              </a:spcBef>
+              <a:spcAft>
+                <a:spcPts val="600"/>
+              </a:spcAft>
+              <a:buNone/>
+            </a:pPr>
+            <a:r>
+              <a:rPr lang="en-US" sz="5200" dirty="0">
+                <a:latin typeface="+mj-lt"/>
+                <a:ea typeface="+mj-ea"/>
+                <a:cs typeface="+mj-cs"/>
+              </a:rPr>
+              <a:t>Distribution clients</a:t>
+            </a:r>
+          </a:p>
+        </p:txBody>
+      </p:sp>
+      <p:pic>
+        <p:nvPicPr>
+          <p:cNvPr id="37" name="Picture 36" descr="A graph of a graph&#10;&#10;AI-generated content may be incorrect.">
+            <a:extLst>
+              <a:ext uri="{FF2B5EF4-FFF2-40B4-BE49-F238E27FC236}">
+                <a16:creationId xmlns:a16="http://schemas.microsoft.com/office/drawing/2014/main" id="{BC922A2E-822A-7BF8-663F-05D21A17B2C1}"/>
+              </a:ext>
+            </a:extLst>
+          </p:cNvPr>
+          <p:cNvPicPr>
+            <a:picLocks noChangeAspect="1"/>
+          </p:cNvPicPr>
+          <p:nvPr/>
+        </p:nvPicPr>
+        <p:blipFill>
+          <a:blip r:embed="rId3">
+            <a:extLst>
+              <a:ext uri="{28A0092B-C50C-407E-A947-70E740481C1C}">
+                <a14:useLocalDpi xmlns:a14="http://schemas.microsoft.com/office/drawing/2010/main" val="0"/>
+              </a:ext>
+            </a:extLst>
+          </a:blip>
+          <a:srcRect b="49991"/>
+          <a:stretch/>
+        </p:blipFill>
+        <p:spPr>
+          <a:xfrm>
+            <a:off x="681494" y="1766898"/>
+            <a:ext cx="5303520" cy="3788909"/>
+          </a:xfrm>
+          <a:prstGeom prst="rect">
+            <a:avLst/>
+          </a:prstGeom>
+        </p:spPr>
+      </p:pic>
+      <p:pic>
+        <p:nvPicPr>
+          <p:cNvPr id="38" name="Picture 37">
+            <a:extLst>
+              <a:ext uri="{FF2B5EF4-FFF2-40B4-BE49-F238E27FC236}">
+                <a16:creationId xmlns:a16="http://schemas.microsoft.com/office/drawing/2014/main" id="{E4C55D7C-017E-1F0D-1357-3CA7E2DBD9DB}"/>
+              </a:ext>
+            </a:extLst>
+          </p:cNvPr>
+          <p:cNvPicPr>
+            <a:picLocks noChangeAspect="1"/>
+          </p:cNvPicPr>
+          <p:nvPr/>
+        </p:nvPicPr>
+        <p:blipFill>
+          <a:blip r:embed="rId3">
+            <a:extLst>
+              <a:ext uri="{28A0092B-C50C-407E-A947-70E740481C1C}">
+                <a14:useLocalDpi xmlns:a14="http://schemas.microsoft.com/office/drawing/2010/main" val="0"/>
+              </a:ext>
+            </a:extLst>
+          </a:blip>
+          <a:srcRect t="50864" b="-2295"/>
+          <a:stretch/>
+        </p:blipFill>
+        <p:spPr>
+          <a:xfrm>
+            <a:off x="6068415" y="1766898"/>
+            <a:ext cx="5303520" cy="3896649"/>
+          </a:xfrm>
+          <a:prstGeom prst="rect">
+            <a:avLst/>
+          </a:prstGeom>
+        </p:spPr>
+      </p:pic>
+    </p:spTree>
+    <p:extLst>
+      <p:ext uri="{BB962C8B-B14F-4D97-AF65-F5344CB8AC3E}">
+        <p14:creationId xmlns:p14="http://schemas.microsoft.com/office/powerpoint/2010/main" val="3215774816"/>
+      </p:ext>
+    </p:extLst>
+  </p:cSld>
+  <p:clrMapOvr>
+    <a:masterClrMapping/>
+  </p:clrMapOvr>
+</p:sld>
+</file>
+
+<file path=ppt/slides/slide7.xml><?xml version="1.0" encoding="utf-8"?>
+<p:sld xmlns:a="http://schemas.openxmlformats.org/drawingml/2006/main" xmlns:r="http://schemas.openxmlformats.org/officeDocument/2006/relationships" xmlns:p="http://schemas.openxmlformats.org/presentationml/2006/main">
+  <p:cSld>
+    <p:bg>
+      <p:bgPr>
+        <a:solidFill>
+          <a:schemeClr val="bg1"/>
+        </a:solidFill>
+        <a:effectLst/>
+      </p:bgPr>
+    </p:bg>
     <p:spTree>
       <p:nvGrpSpPr>
         <p:cNvPr id="1" name=""/>
@@ -13262,6 +14118,66 @@
           <a:chExt cx="0" cy="0"/>
         </a:xfrm>
       </p:grpSpPr>
+      <p:sp useBgFill="1">
+        <p:nvSpPr>
+          <p:cNvPr id="22" name="Rectangle 21">
+            <a:extLst>
+              <a:ext uri="{FF2B5EF4-FFF2-40B4-BE49-F238E27FC236}">
+                <a16:creationId xmlns:a16="http://schemas.microsoft.com/office/drawing/2014/main" id="{DBF61EA3-B236-439E-9C0B-340980D56BEE}"/>
+              </a:ext>
+              <a:ext uri="{C183D7F6-B498-43B3-948B-1728B52AA6E4}">
+                <adec:decorative xmlns:adec="http://schemas.microsoft.com/office/drawing/2017/decorative" val="1"/>
+              </a:ext>
+            </a:extLst>
+          </p:cNvPr>
+          <p:cNvSpPr>
+            <a:spLocks noGrp="1" noRot="1" noChangeAspect="1" noMove="1" noResize="1" noEditPoints="1" noAdjustHandles="1" noChangeArrowheads="1" noChangeShapeType="1" noTextEdit="1"/>
+          </p:cNvSpPr>
+          <p:nvPr>
+            <p:extLst>
+              <p:ext uri="{386F3935-93C4-4BCD-93E2-E3B085C9AB24}">
+                <p16:designElem xmlns:p16="http://schemas.microsoft.com/office/powerpoint/2015/main" val="1"/>
+              </p:ext>
+            </p:extLst>
+          </p:nvPr>
+        </p:nvSpPr>
+        <p:spPr>
+          <a:xfrm>
+            <a:off x="0" y="0"/>
+            <a:ext cx="12191999" cy="6857365"/>
+          </a:xfrm>
+          <a:prstGeom prst="rect">
+            <a:avLst/>
+          </a:prstGeom>
+          <a:ln>
+            <a:noFill/>
+          </a:ln>
+        </p:spPr>
+        <p:style>
+          <a:lnRef idx="2">
+            <a:schemeClr val="accent1">
+              <a:shade val="50000"/>
+            </a:schemeClr>
+          </a:lnRef>
+          <a:fillRef idx="1">
+            <a:schemeClr val="accent1"/>
+          </a:fillRef>
+          <a:effectRef idx="0">
+            <a:schemeClr val="accent1"/>
+          </a:effectRef>
+          <a:fontRef idx="minor">
+            <a:schemeClr val="lt1"/>
+          </a:fontRef>
+        </p:style>
+        <p:txBody>
+          <a:bodyPr rtlCol="0" anchor="ctr"/>
+          <a:lstStyle/>
+          <a:p>
+            <a:pPr algn="ctr"/>
+            <a:endParaRPr lang="en-US"/>
+          </a:p>
+        </p:txBody>
+      </p:sp>
       <p:sp>
         <p:nvSpPr>
           <p:cNvPr id="2" name="Title 1">
@@ -13278,15 +14194,246 @@
             <p:ph type="title"/>
           </p:nvPr>
         </p:nvSpPr>
-        <p:spPr/>
+        <p:spPr>
+          <a:xfrm>
+            <a:off x="808638" y="386930"/>
+            <a:ext cx="9236700" cy="1188950"/>
+          </a:xfrm>
+        </p:spPr>
         <p:txBody>
-          <a:bodyPr/>
+          <a:bodyPr anchor="b">
+            <a:normAutofit/>
+          </a:bodyPr>
           <a:lstStyle/>
           <a:p>
             <a:r>
-              <a:rPr lang="en-US" dirty="0"/>
+              <a:rPr lang="en-US" sz="5400"/>
               <a:t>Challenges</a:t>
             </a:r>
+          </a:p>
+        </p:txBody>
+      </p:sp>
+      <p:grpSp>
+        <p:nvGrpSpPr>
+          <p:cNvPr id="24" name="Group 23">
+            <a:extLst>
+              <a:ext uri="{FF2B5EF4-FFF2-40B4-BE49-F238E27FC236}">
+                <a16:creationId xmlns:a16="http://schemas.microsoft.com/office/drawing/2014/main" id="{28FAF094-D087-493F-8DF9-A486C2D6BBAA}"/>
+              </a:ext>
+              <a:ext uri="{C183D7F6-B498-43B3-948B-1728B52AA6E4}">
+                <adec:decorative xmlns:adec="http://schemas.microsoft.com/office/drawing/2017/decorative" val="1"/>
+              </a:ext>
+            </a:extLst>
+          </p:cNvPr>
+          <p:cNvGrpSpPr>
+            <a:grpSpLocks noGrp="1" noUngrp="1" noRot="1" noChangeAspect="1" noMove="1" noResize="1"/>
+          </p:cNvGrpSpPr>
+          <p:nvPr>
+            <p:extLst>
+              <p:ext uri="{386F3935-93C4-4BCD-93E2-E3B085C9AB24}">
+                <p16:designElem xmlns:p16="http://schemas.microsoft.com/office/powerpoint/2015/main" val="1"/>
+              </p:ext>
+            </p:extLst>
+          </p:nvPr>
+        </p:nvGrpSpPr>
+        <p:grpSpPr>
+          <a:xfrm>
+            <a:off x="-2" y="1998368"/>
+            <a:ext cx="11695083" cy="782176"/>
+            <a:chOff x="-2" y="1998368"/>
+            <a:chExt cx="11695083" cy="782176"/>
+          </a:xfrm>
+        </p:grpSpPr>
+        <p:sp>
+          <p:nvSpPr>
+            <p:cNvPr id="25" name="Rectangle 24">
+              <a:extLst>
+                <a:ext uri="{FF2B5EF4-FFF2-40B4-BE49-F238E27FC236}">
+                  <a16:creationId xmlns:a16="http://schemas.microsoft.com/office/drawing/2014/main" id="{8D7C88D8-5509-4514-925A-9CE148E5CBD6}"/>
+                </a:ext>
+                <a:ext uri="{C183D7F6-B498-43B3-948B-1728B52AA6E4}">
+                  <adec:decorative xmlns:adec="http://schemas.microsoft.com/office/drawing/2017/decorative" val="1"/>
+                </a:ext>
+              </a:extLst>
+            </p:cNvPr>
+            <p:cNvSpPr/>
+            <p:nvPr>
+              <p:extLst>
+                <p:ext uri="{386F3935-93C4-4BCD-93E2-E3B085C9AB24}">
+                  <p16:designElem xmlns:p16="http://schemas.microsoft.com/office/powerpoint/2015/main" val="1"/>
+                </p:ext>
+              </p:extLst>
+            </p:nvPr>
+          </p:nvSpPr>
+          <p:spPr>
+            <a:xfrm rot="5400000">
+              <a:off x="11228040" y="2313027"/>
+              <a:ext cx="781700" cy="152382"/>
+            </a:xfrm>
+            <a:prstGeom prst="rect">
+              <a:avLst/>
+            </a:prstGeom>
+            <a:solidFill>
+              <a:schemeClr val="accent4"/>
+            </a:solidFill>
+            <a:ln>
+              <a:noFill/>
+            </a:ln>
+          </p:spPr>
+          <p:style>
+            <a:lnRef idx="2">
+              <a:schemeClr val="accent1">
+                <a:shade val="50000"/>
+              </a:schemeClr>
+            </a:lnRef>
+            <a:fillRef idx="1">
+              <a:schemeClr val="accent1"/>
+            </a:fillRef>
+            <a:effectRef idx="0">
+              <a:schemeClr val="accent1"/>
+            </a:effectRef>
+            <a:fontRef idx="minor">
+              <a:schemeClr val="lt1"/>
+            </a:fontRef>
+          </p:style>
+          <p:txBody>
+            <a:bodyPr rtlCol="0" anchor="ctr"/>
+            <a:lstStyle/>
+            <a:p>
+              <a:pPr algn="ctr"/>
+              <a:endParaRPr lang="en-US"/>
+            </a:p>
+          </p:txBody>
+        </p:sp>
+        <p:sp>
+          <p:nvSpPr>
+            <p:cNvPr id="26" name="Rectangle 25">
+              <a:extLst>
+                <a:ext uri="{FF2B5EF4-FFF2-40B4-BE49-F238E27FC236}">
+                  <a16:creationId xmlns:a16="http://schemas.microsoft.com/office/drawing/2014/main" id="{7275593D-F75E-4426-AE3E-2CDEFD228D25}"/>
+                </a:ext>
+                <a:ext uri="{C183D7F6-B498-43B3-948B-1728B52AA6E4}">
+                  <adec:decorative xmlns:adec="http://schemas.microsoft.com/office/drawing/2017/decorative" val="1"/>
+                </a:ext>
+              </a:extLst>
+            </p:cNvPr>
+            <p:cNvSpPr/>
+            <p:nvPr>
+              <p:extLst>
+                <p:ext uri="{386F3935-93C4-4BCD-93E2-E3B085C9AB24}">
+                  <p16:designElem xmlns:p16="http://schemas.microsoft.com/office/powerpoint/2015/main" val="1"/>
+                </p:ext>
+              </p:extLst>
+            </p:nvPr>
+          </p:nvSpPr>
+          <p:spPr>
+            <a:xfrm flipH="1" flipV="1">
+              <a:off x="-2" y="1998845"/>
+              <a:ext cx="11454595" cy="781699"/>
+            </a:xfrm>
+            <a:prstGeom prst="rect">
+              <a:avLst/>
+            </a:prstGeom>
+            <a:solidFill>
+              <a:schemeClr val="accent4"/>
+            </a:solidFill>
+            <a:ln>
+              <a:noFill/>
+            </a:ln>
+          </p:spPr>
+          <p:style>
+            <a:lnRef idx="2">
+              <a:schemeClr val="accent1">
+                <a:shade val="50000"/>
+              </a:schemeClr>
+            </a:lnRef>
+            <a:fillRef idx="1">
+              <a:schemeClr val="accent1"/>
+            </a:fillRef>
+            <a:effectRef idx="0">
+              <a:schemeClr val="accent1"/>
+            </a:effectRef>
+            <a:fontRef idx="minor">
+              <a:schemeClr val="lt1"/>
+            </a:fontRef>
+          </p:style>
+          <p:txBody>
+            <a:bodyPr rtlCol="0" anchor="ctr"/>
+            <a:lstStyle/>
+            <a:p>
+              <a:pPr algn="ctr"/>
+              <a:endParaRPr lang="en-US"/>
+            </a:p>
+          </p:txBody>
+        </p:sp>
+      </p:grpSp>
+      <p:sp>
+        <p:nvSpPr>
+          <p:cNvPr id="28" name="Rectangle 27">
+            <a:extLst>
+              <a:ext uri="{FF2B5EF4-FFF2-40B4-BE49-F238E27FC236}">
+                <a16:creationId xmlns:a16="http://schemas.microsoft.com/office/drawing/2014/main" id="{E659831F-0D9A-4C63-9EBB-8435B85A440F}"/>
+              </a:ext>
+              <a:ext uri="{C183D7F6-B498-43B3-948B-1728B52AA6E4}">
+                <adec:decorative xmlns:adec="http://schemas.microsoft.com/office/drawing/2017/decorative" val="1"/>
+              </a:ext>
+            </a:extLst>
+          </p:cNvPr>
+          <p:cNvSpPr>
+            <a:spLocks noGrp="1" noRot="1" noChangeAspect="1" noMove="1" noResize="1" noEditPoints="1" noAdjustHandles="1" noChangeArrowheads="1" noChangeShapeType="1" noTextEdit="1"/>
+          </p:cNvSpPr>
+          <p:nvPr>
+            <p:extLst>
+              <p:ext uri="{386F3935-93C4-4BCD-93E2-E3B085C9AB24}">
+                <p16:designElem xmlns:p16="http://schemas.microsoft.com/office/powerpoint/2015/main" val="1"/>
+              </p:ext>
+            </p:extLst>
+          </p:nvPr>
+        </p:nvSpPr>
+        <p:spPr>
+          <a:xfrm>
+            <a:off x="0" y="2203079"/>
+            <a:ext cx="11383362" cy="4147845"/>
+          </a:xfrm>
+          <a:prstGeom prst="rect">
+            <a:avLst/>
+          </a:prstGeom>
+          <a:solidFill>
+            <a:schemeClr val="bg1"/>
+          </a:solidFill>
+          <a:ln>
+            <a:noFill/>
+          </a:ln>
+          <a:effectLst>
+            <a:outerShdw blurRad="139700" dist="127000" dir="5400000" algn="t" rotWithShape="0">
+              <a:prstClr val="black">
+                <a:alpha val="15000"/>
+              </a:prstClr>
+            </a:outerShdw>
+          </a:effectLst>
+        </p:spPr>
+        <p:style>
+          <a:lnRef idx="2">
+            <a:schemeClr val="accent1">
+              <a:shade val="50000"/>
+            </a:schemeClr>
+          </a:lnRef>
+          <a:fillRef idx="1">
+            <a:schemeClr val="accent1"/>
+          </a:fillRef>
+          <a:effectRef idx="0">
+            <a:schemeClr val="accent1"/>
+          </a:effectRef>
+          <a:fontRef idx="minor">
+            <a:schemeClr val="lt1"/>
+          </a:fontRef>
+        </p:style>
+        <p:txBody>
+          <a:bodyPr rtlCol="0" anchor="ctr"/>
+          <a:lstStyle/>
+          <a:p>
+            <a:pPr algn="ctr"/>
+            <a:endParaRPr lang="en-US"/>
           </a:p>
         </p:txBody>
       </p:sp>
@@ -13306,32 +14453,39 @@
             <p:ph idx="1"/>
           </p:nvPr>
         </p:nvSpPr>
-        <p:spPr/>
+        <p:spPr>
+          <a:xfrm>
+            <a:off x="793660" y="2599509"/>
+            <a:ext cx="10143668" cy="3435531"/>
+          </a:xfrm>
+        </p:spPr>
         <p:txBody>
-          <a:bodyPr/>
+          <a:bodyPr anchor="ctr">
+            <a:normAutofit/>
+          </a:bodyPr>
           <a:lstStyle/>
           <a:p>
             <a:r>
-              <a:rPr lang="en-US" dirty="0"/>
-              <a:t>Size of data set</a:t>
+              <a:rPr lang="en-US" sz="2400" dirty="0"/>
+              <a:t>Panel data with only 7 periods</a:t>
             </a:r>
           </a:p>
           <a:p>
             <a:r>
-              <a:rPr lang="en-US" dirty="0"/>
+              <a:rPr lang="en-US" sz="2400" dirty="0"/>
               <a:t>Missing values or no sales?</a:t>
             </a:r>
           </a:p>
           <a:p>
             <a:r>
-              <a:rPr lang="en-US" dirty="0"/>
+              <a:rPr lang="en-US" sz="2400" dirty="0"/>
               <a:t>New clients and new products</a:t>
             </a:r>
           </a:p>
           <a:p>
             <a:r>
-              <a:rPr lang="en-US" dirty="0"/>
-              <a:t>Time series data with only 7 events</a:t>
+              <a:rPr lang="en-US" sz="2400" dirty="0"/>
+              <a:t>Size of data set</a:t>
             </a:r>
           </a:p>
         </p:txBody>
@@ -13349,7 +14503,7 @@
 </p:sld>
 </file>
 
-<file path=ppt/slides/slide7.xml><?xml version="1.0" encoding="utf-8"?>
+<file path=ppt/slides/slide8.xml><?xml version="1.0" encoding="utf-8"?>
 <p:sld xmlns:a="http://schemas.openxmlformats.org/drawingml/2006/main" xmlns:r="http://schemas.openxmlformats.org/officeDocument/2006/relationships" xmlns:p="http://schemas.openxmlformats.org/presentationml/2006/main">
   <p:cSld>
     <p:spTree>
@@ -13453,7 +14607,7 @@
 </p:sld>
 </file>
 
-<file path=ppt/slides/slide8.xml><?xml version="1.0" encoding="utf-8"?>
+<file path=ppt/slides/slide9.xml><?xml version="1.0" encoding="utf-8"?>
 <p:sld xmlns:a="http://schemas.openxmlformats.org/drawingml/2006/main" xmlns:r="http://schemas.openxmlformats.org/officeDocument/2006/relationships" xmlns:p="http://schemas.openxmlformats.org/presentationml/2006/main">
   <p:cSld>
     <p:spTree>
@@ -13854,118 +15008,6 @@
     <p:extLst>
       <p:ext uri="{BB962C8B-B14F-4D97-AF65-F5344CB8AC3E}">
         <p14:creationId xmlns:p14="http://schemas.microsoft.com/office/powerpoint/2010/main" val="4035612856"/>
-      </p:ext>
-    </p:extLst>
-  </p:cSld>
-  <p:clrMapOvr>
-    <a:masterClrMapping/>
-  </p:clrMapOvr>
-</p:sld>
-</file>
-
-<file path=ppt/slides/slide9.xml><?xml version="1.0" encoding="utf-8"?>
-<p:sld xmlns:a="http://schemas.openxmlformats.org/drawingml/2006/main" xmlns:r="http://schemas.openxmlformats.org/officeDocument/2006/relationships" xmlns:p="http://schemas.openxmlformats.org/presentationml/2006/main">
-  <p:cSld>
-    <p:spTree>
-      <p:nvGrpSpPr>
-        <p:cNvPr id="1" name=""/>
-        <p:cNvGrpSpPr/>
-        <p:nvPr/>
-      </p:nvGrpSpPr>
-      <p:grpSpPr>
-        <a:xfrm>
-          <a:off x="0" y="0"/>
-          <a:ext cx="0" cy="0"/>
-          <a:chOff x="0" y="0"/>
-          <a:chExt cx="0" cy="0"/>
-        </a:xfrm>
-      </p:grpSpPr>
-      <p:sp>
-        <p:nvSpPr>
-          <p:cNvPr id="2" name="Title 1">
-            <a:extLst>
-              <a:ext uri="{FF2B5EF4-FFF2-40B4-BE49-F238E27FC236}">
-                <a16:creationId xmlns:a16="http://schemas.microsoft.com/office/drawing/2014/main" id="{FE9E90A2-174E-5B20-640F-5D4DD79EC5C9}"/>
-              </a:ext>
-            </a:extLst>
-          </p:cNvPr>
-          <p:cNvSpPr>
-            <a:spLocks noGrp="1"/>
-          </p:cNvSpPr>
-          <p:nvPr>
-            <p:ph type="title"/>
-          </p:nvPr>
-        </p:nvSpPr>
-        <p:spPr/>
-        <p:txBody>
-          <a:bodyPr/>
-          <a:lstStyle/>
-          <a:p>
-            <a:r>
-              <a:rPr lang="en-US" dirty="0" err="1"/>
-              <a:t>xgboost</a:t>
-            </a:r>
-            <a:r>
-              <a:rPr lang="en-US" dirty="0"/>
-              <a:t> model</a:t>
-            </a:r>
-          </a:p>
-        </p:txBody>
-      </p:sp>
-      <p:sp>
-        <p:nvSpPr>
-          <p:cNvPr id="3" name="Content Placeholder 2">
-            <a:extLst>
-              <a:ext uri="{FF2B5EF4-FFF2-40B4-BE49-F238E27FC236}">
-                <a16:creationId xmlns:a16="http://schemas.microsoft.com/office/drawing/2014/main" id="{D8515897-033D-B200-2EC8-376CF4FBA309}"/>
-              </a:ext>
-            </a:extLst>
-          </p:cNvPr>
-          <p:cNvSpPr>
-            <a:spLocks noGrp="1"/>
-          </p:cNvSpPr>
-          <p:nvPr>
-            <p:ph idx="1"/>
-          </p:nvPr>
-        </p:nvSpPr>
-        <p:spPr/>
-        <p:txBody>
-          <a:bodyPr/>
-          <a:lstStyle/>
-          <a:p>
-            <a:r>
-              <a:rPr lang="en-US" dirty="0" err="1"/>
-              <a:t>Gridseach</a:t>
-            </a:r>
-            <a:r>
-              <a:rPr lang="en-US" dirty="0"/>
-              <a:t> cross validation</a:t>
-            </a:r>
-          </a:p>
-          <a:p>
-            <a:r>
-              <a:rPr lang="en-US" dirty="0"/>
-              <a:t>Features: adjusted demand of the previous 3 weeks, client ID, client mean/median/min/max, product ID, product mean/median</a:t>
-            </a:r>
-          </a:p>
-          <a:p>
-            <a:r>
-              <a:rPr lang="en-US" dirty="0"/>
-              <a:t>Root mean squared log error of 0.493</a:t>
-            </a:r>
-          </a:p>
-          <a:p>
-            <a:r>
-              <a:rPr lang="en-US" dirty="0"/>
-              <a:t>Top Kaggle score is 0.442</a:t>
-            </a:r>
-          </a:p>
-        </p:txBody>
-      </p:sp>
-    </p:spTree>
-    <p:extLst>
-      <p:ext uri="{BB962C8B-B14F-4D97-AF65-F5344CB8AC3E}">
-        <p14:creationId xmlns:p14="http://schemas.microsoft.com/office/powerpoint/2010/main" val="1019809051"/>
       </p:ext>
     </p:extLst>
   </p:cSld>
@@ -14603,4 +15645,24 @@
     </a:ext>
   </a:extLst>
 </a:theme>
+</file>
+
+<file path=ppt/webextensions/taskpanes.xml><?xml version="1.0" encoding="utf-8"?>
+<wetp:taskpanes xmlns:wetp="http://schemas.microsoft.com/office/webextensions/taskpanes/2010/11">
+  <wetp:taskpane dockstate="right" visibility="0" width="525" row="3">
+    <wetp:webextensionref xmlns:r="http://schemas.openxmlformats.org/officeDocument/2006/relationships" r:id="rId1"/>
+  </wetp:taskpane>
+</wetp:taskpanes>
+</file>
+
+<file path=ppt/webextensions/webextension1.xml><?xml version="1.0" encoding="utf-8"?>
+<we:webextension xmlns:we="http://schemas.microsoft.com/office/webextensions/webextension/2010/11" id="{DF1162D5-7134-4C1B-A712-81BFBF4C9365}">
+  <we:reference id="wa200005566" version="3.0.0.3" store="en-US" storeType="OMEX"/>
+  <we:alternateReferences>
+    <we:reference id="wa200005566" version="3.0.0.3" store="wa200005566" storeType="OMEX"/>
+  </we:alternateReferences>
+  <we:properties/>
+  <we:bindings/>
+  <we:snapshot xmlns:r="http://schemas.openxmlformats.org/officeDocument/2006/relationships"/>
+</we:webextension>
 </file>
</xml_diff>